<commit_message>
slides for my viva
</commit_message>
<xml_diff>
--- a/Report/MscCurrentCostPrjctPresentation.pptx
+++ b/Report/MscCurrentCostPrjctPresentation.pptx
@@ -416,7 +416,7 @@
           <a:p>
             <a:fld id="{B01F9CA3-105E-4857-9057-6DB6197DA786}" type="datetimeFigureOut">
               <a:rPr lang="en-US" smtClean="0"/>
-              <a:t>03/09/2012</a:t>
+              <a:t>05/09/2012</a:t>
             </a:fld>
             <a:endParaRPr lang="en-US"/>
           </a:p>
@@ -608,7 +608,7 @@
           <a:p>
             <a:fld id="{B01F9CA3-105E-4857-9057-6DB6197DA786}" type="datetimeFigureOut">
               <a:rPr lang="en-US" smtClean="0"/>
-              <a:t>03/09/2012</a:t>
+              <a:t>05/09/2012</a:t>
             </a:fld>
             <a:endParaRPr lang="en-US"/>
           </a:p>
@@ -877,7 +877,7 @@
           <a:p>
             <a:fld id="{B01F9CA3-105E-4857-9057-6DB6197DA786}" type="datetimeFigureOut">
               <a:rPr lang="en-US" smtClean="0"/>
-              <a:t>03/09/2012</a:t>
+              <a:t>05/09/2012</a:t>
             </a:fld>
             <a:endParaRPr lang="en-US"/>
           </a:p>
@@ -1056,7 +1056,7 @@
           <a:p>
             <a:fld id="{B01F9CA3-105E-4857-9057-6DB6197DA786}" type="datetimeFigureOut">
               <a:rPr lang="en-US" smtClean="0"/>
-              <a:t>03/09/2012</a:t>
+              <a:t>05/09/2012</a:t>
             </a:fld>
             <a:endParaRPr lang="en-US"/>
           </a:p>
@@ -1225,7 +1225,7 @@
           <a:p>
             <a:fld id="{B01F9CA3-105E-4857-9057-6DB6197DA786}" type="datetimeFigureOut">
               <a:rPr lang="en-US" smtClean="0"/>
-              <a:t>03/09/2012</a:t>
+              <a:t>05/09/2012</a:t>
             </a:fld>
             <a:endParaRPr lang="en-US"/>
           </a:p>
@@ -1467,7 +1467,7 @@
           <a:p>
             <a:fld id="{B01F9CA3-105E-4857-9057-6DB6197DA786}" type="datetimeFigureOut">
               <a:rPr lang="en-US" smtClean="0"/>
-              <a:t>03/09/2012</a:t>
+              <a:t>05/09/2012</a:t>
             </a:fld>
             <a:endParaRPr lang="en-US"/>
           </a:p>
@@ -1790,7 +1790,7 @@
           <a:p>
             <a:fld id="{B01F9CA3-105E-4857-9057-6DB6197DA786}" type="datetimeFigureOut">
               <a:rPr lang="en-US" smtClean="0"/>
-              <a:t>03/09/2012</a:t>
+              <a:t>05/09/2012</a:t>
             </a:fld>
             <a:endParaRPr lang="en-US"/>
           </a:p>
@@ -2088,7 +2088,7 @@
           <a:p>
             <a:fld id="{B01F9CA3-105E-4857-9057-6DB6197DA786}" type="datetimeFigureOut">
               <a:rPr lang="en-US" smtClean="0"/>
-              <a:t>03/09/2012</a:t>
+              <a:t>05/09/2012</a:t>
             </a:fld>
             <a:endParaRPr lang="en-US"/>
           </a:p>
@@ -2544,7 +2544,7 @@
           <a:p>
             <a:fld id="{B01F9CA3-105E-4857-9057-6DB6197DA786}" type="datetimeFigureOut">
               <a:rPr lang="en-US" smtClean="0"/>
-              <a:t>03/09/2012</a:t>
+              <a:t>05/09/2012</a:t>
             </a:fld>
             <a:endParaRPr lang="en-US"/>
           </a:p>
@@ -2657,7 +2657,7 @@
           <a:p>
             <a:fld id="{B01F9CA3-105E-4857-9057-6DB6197DA786}" type="datetimeFigureOut">
               <a:rPr lang="en-US" smtClean="0"/>
-              <a:t>03/09/2012</a:t>
+              <a:t>05/09/2012</a:t>
             </a:fld>
             <a:endParaRPr lang="en-US"/>
           </a:p>
@@ -2747,7 +2747,7 @@
           <a:p>
             <a:fld id="{B01F9CA3-105E-4857-9057-6DB6197DA786}" type="datetimeFigureOut">
               <a:rPr lang="en-US" smtClean="0"/>
-              <a:t>03/09/2012</a:t>
+              <a:t>05/09/2012</a:t>
             </a:fld>
             <a:endParaRPr lang="en-US"/>
           </a:p>
@@ -3029,7 +3029,7 @@
           <a:p>
             <a:fld id="{B01F9CA3-105E-4857-9057-6DB6197DA786}" type="datetimeFigureOut">
               <a:rPr lang="en-US" smtClean="0"/>
-              <a:t>03/09/2012</a:t>
+              <a:t>05/09/2012</a:t>
             </a:fld>
             <a:endParaRPr lang="en-US"/>
           </a:p>
@@ -3235,7 +3235,7 @@
           <a:p>
             <a:fld id="{B01F9CA3-105E-4857-9057-6DB6197DA786}" type="datetimeFigureOut">
               <a:rPr lang="en-US" smtClean="0"/>
-              <a:t>03/09/2012</a:t>
+              <a:t>05/09/2012</a:t>
             </a:fld>
             <a:endParaRPr lang="en-US"/>
           </a:p>
@@ -3797,11 +3797,7 @@
           <a:p>
             <a:r>
               <a:rPr lang="en-US" dirty="0" smtClean="0"/>
-              <a:t>2) Signal </a:t>
-            </a:r>
-            <a:r>
-              <a:rPr lang="en-US" dirty="0" smtClean="0"/>
-              <a:t>Processing &amp; Disaggregation</a:t>
+              <a:t>2) Signal Processing &amp; Disaggregation</a:t>
             </a:r>
             <a:endParaRPr lang="en-US" dirty="0"/>
           </a:p>
@@ -4989,15 +4985,7 @@
           <a:p>
             <a:r>
               <a:rPr lang="en-US" dirty="0" smtClean="0"/>
-              <a:t>These concerns mean we require to be </a:t>
-            </a:r>
-            <a:r>
-              <a:rPr lang="en-US" dirty="0" smtClean="0"/>
-              <a:t>more efficient with</a:t>
-            </a:r>
-            <a:r>
-              <a:rPr lang="en-US" dirty="0" smtClean="0"/>
-              <a:t> consumption management. This requires better and automated analysis tools.</a:t>
+              <a:t>These concerns mean we require to be more efficient with consumption management. This requires better and automated analysis tools.</a:t>
             </a:r>
           </a:p>
           <a:p>
@@ -5342,14 +5330,14 @@
             <p:ph idx="1"/>
             <p:extLst>
               <p:ext uri="{D42A27DB-BD31-4B8C-83A1-F6EECF244321}">
-                <p14:modId xmlns:p14="http://schemas.microsoft.com/office/powerpoint/2010/main" val="1446242451"/>
+                <p14:modId xmlns:p14="http://schemas.microsoft.com/office/powerpoint/2010/main" val="912978490"/>
               </p:ext>
             </p:extLst>
           </p:nvPr>
         </p:nvGraphicFramePr>
         <p:xfrm>
           <a:off x="435109" y="2185226"/>
-          <a:ext cx="8042274" cy="3388359"/>
+          <a:ext cx="8042274" cy="4211319"/>
         </p:xfrm>
         <a:graphic>
           <a:graphicData uri="http://schemas.openxmlformats.org/drawingml/2006/table">
@@ -5384,7 +5372,7 @@
                     <a:p>
                       <a:r>
                         <a:rPr lang="en-US" dirty="0" smtClean="0"/>
-                        <a:t>Semantics</a:t>
+                        <a:t>Human language</a:t>
                       </a:r>
                       <a:endParaRPr lang="en-US" dirty="0"/>
                     </a:p>
@@ -5398,7 +5386,7 @@
                     <a:p>
                       <a:r>
                         <a:rPr lang="en-US" dirty="0" smtClean="0"/>
-                        <a:t>Translation</a:t>
+                        <a:t>Translation to signal processing</a:t>
                       </a:r>
                       <a:endParaRPr lang="en-US" dirty="0"/>
                     </a:p>
@@ -5445,7 +5433,15 @@
                     <a:p>
                       <a:r>
                         <a:rPr lang="en-US" dirty="0" smtClean="0"/>
-                        <a:t>‘is toaster or grill used between 13-15?’. </a:t>
+                        <a:t>‘A</a:t>
+                      </a:r>
+                      <a:r>
+                        <a:rPr lang="en-US" baseline="0" dirty="0" smtClean="0"/>
+                        <a:t> person p has lunch’</a:t>
+                      </a:r>
+                      <a:r>
+                        <a:rPr lang="en-US" dirty="0" smtClean="0"/>
+                        <a:t> </a:t>
                       </a:r>
                       <a:endParaRPr lang="en-US" dirty="0"/>
                     </a:p>
@@ -5534,11 +5530,15 @@
                     <a:p>
                       <a:r>
                         <a:rPr lang="en-US" dirty="0" smtClean="0"/>
-                        <a:t>‘There is electrical</a:t>
+                        <a:t>‘There </a:t>
+                      </a:r>
+                      <a:r>
+                        <a:rPr lang="en-US" dirty="0" smtClean="0"/>
+                        <a:t>is</a:t>
                       </a:r>
                       <a:r>
                         <a:rPr lang="en-US" baseline="0" dirty="0" smtClean="0"/>
-                        <a:t> activity (usage)</a:t>
+                        <a:t> activity/usage in the house</a:t>
                       </a:r>
                       <a:r>
                         <a:rPr lang="en-US" dirty="0" smtClean="0"/>
@@ -5573,7 +5573,31 @@
                       </a:pPr>
                       <a:r>
                         <a:rPr lang="en-US" dirty="0" smtClean="0"/>
-                        <a:t>histogram analysis of bins with significant counts.</a:t>
+                        <a:t>histogram analysis </a:t>
+                      </a:r>
+                      <a:r>
+                        <a:rPr lang="en-US" dirty="0" smtClean="0"/>
+                        <a:t>yields</a:t>
+                      </a:r>
+                      <a:r>
+                        <a:rPr lang="en-US" baseline="0" dirty="0" smtClean="0"/>
+                        <a:t> at least one </a:t>
+                      </a:r>
+                      <a:r>
+                        <a:rPr lang="en-US" dirty="0" smtClean="0"/>
+                        <a:t>bin</a:t>
+                      </a:r>
+                      <a:r>
+                        <a:rPr lang="en-US" baseline="0" dirty="0" smtClean="0"/>
+                        <a:t> other than phantom bins </a:t>
+                      </a:r>
+                      <a:r>
+                        <a:rPr lang="en-US" dirty="0" smtClean="0"/>
+                        <a:t>with </a:t>
+                      </a:r>
+                      <a:r>
+                        <a:rPr lang="en-US" dirty="0" smtClean="0"/>
+                        <a:t>significant counts.</a:t>
                       </a:r>
                     </a:p>
                   </a:txBody>
@@ -5626,7 +5650,15 @@
                       </a:r>
                       <a:r>
                         <a:rPr lang="en-US" baseline="0" dirty="0" smtClean="0"/>
-                        <a:t> or little activity over night’</a:t>
+                        <a:t> or little </a:t>
+                      </a:r>
+                      <a:r>
+                        <a:rPr lang="en-US" baseline="0" dirty="0" smtClean="0"/>
+                        <a:t>activity/usage during night</a:t>
+                      </a:r>
+                      <a:r>
+                        <a:rPr lang="en-US" baseline="0" dirty="0" smtClean="0"/>
+                        <a:t>’</a:t>
                       </a:r>
                       <a:endParaRPr lang="en-US" dirty="0"/>
                     </a:p>
@@ -5640,11 +5672,23 @@
                     <a:p>
                       <a:r>
                         <a:rPr lang="en-US" dirty="0" smtClean="0"/>
-                        <a:t>Histogram analysis checking to see that</a:t>
+                        <a:t>Histogram analysis </a:t>
+                      </a:r>
+                      <a:r>
+                        <a:rPr lang="en-US" dirty="0" smtClean="0"/>
+                        <a:t>of</a:t>
                       </a:r>
                       <a:r>
                         <a:rPr lang="en-US" baseline="0" dirty="0" smtClean="0"/>
-                        <a:t> higher value bins are non-existent or minimal.</a:t>
+                        <a:t> time slice between 23:00</a:t>
+                      </a:r>
+                      <a:r>
+                        <a:rPr lang="en-US" dirty="0" smtClean="0"/>
+                        <a:t> and 8:00 returns</a:t>
+                      </a:r>
+                      <a:r>
+                        <a:rPr lang="en-US" baseline="0" dirty="0" smtClean="0"/>
+                        <a:t> no existence of bins other than phantom.</a:t>
                       </a:r>
                       <a:endParaRPr lang="en-US" dirty="0"/>
                     </a:p>
@@ -5946,15 +5990,7 @@
           <a:p>
             <a:r>
               <a:rPr lang="en-US" dirty="0" smtClean="0"/>
-              <a:t>This project </a:t>
-            </a:r>
-            <a:r>
-              <a:rPr lang="en-US" dirty="0" smtClean="0"/>
-              <a:t>presents </a:t>
-            </a:r>
-            <a:r>
-              <a:rPr lang="en-US" dirty="0" smtClean="0"/>
-              <a:t>a proof of concept.</a:t>
+              <a:t>This project presents a proof of concept.</a:t>
             </a:r>
             <a:endParaRPr lang="en-US" dirty="0"/>
           </a:p>
@@ -5967,11 +6003,7 @@
           <a:p>
             <a:r>
               <a:rPr lang="en-US" dirty="0" smtClean="0"/>
-              <a:t>Information derived can be used for future reasoning such as recommendations for users and analysis and research for companies and </a:t>
-            </a:r>
-            <a:r>
-              <a:rPr lang="en-US" dirty="0" smtClean="0"/>
-              <a:t>government.</a:t>
+              <a:t>Information derived can be used for future reasoning such as recommendations for users and analysis and research for companies and government.</a:t>
             </a:r>
           </a:p>
           <a:p>
@@ -5981,11 +6013,7 @@
             </a:r>
             <a:r>
               <a:rPr lang="en-US" dirty="0" smtClean="0"/>
-              <a:t>.</a:t>
-            </a:r>
-            <a:r>
-              <a:rPr lang="en-US" dirty="0" smtClean="0"/>
-              <a:t> useful for automated building resources management.</a:t>
+              <a:t>. useful for automated building resources management.</a:t>
             </a:r>
             <a:endParaRPr lang="en-US" dirty="0"/>
           </a:p>
@@ -6109,19 +6137,7 @@
           <a:p>
             <a:r>
               <a:rPr lang="en-US" dirty="0" smtClean="0"/>
-              <a:t>Find more mathematical and statistical methods for signal processing. </a:t>
-            </a:r>
-            <a:r>
-              <a:rPr lang="en-US" dirty="0" smtClean="0"/>
-              <a:t>(refine </a:t>
-            </a:r>
-            <a:r>
-              <a:rPr lang="en-US" dirty="0" smtClean="0"/>
-              <a:t>ideas already alluded to</a:t>
-            </a:r>
-            <a:r>
-              <a:rPr lang="en-US" dirty="0" smtClean="0"/>
-              <a:t>).</a:t>
+              <a:t>Find more mathematical and statistical methods for signal processing. (refine ideas already alluded to).</a:t>
             </a:r>
           </a:p>
           <a:p>
@@ -6129,7 +6145,6 @@
               <a:rPr lang="en-US" dirty="0" smtClean="0"/>
               <a:t>‘Layered’ histogram analysis approach.</a:t>
             </a:r>
-            <a:endParaRPr lang="en-US" dirty="0" smtClean="0"/>
           </a:p>
           <a:p>
             <a:r>
@@ -6142,7 +6157,6 @@
               <a:rPr lang="en-US" dirty="0" smtClean="0"/>
               <a:t>Introduce more ‘fuzziness’.</a:t>
             </a:r>
-            <a:endParaRPr lang="en-US" dirty="0" smtClean="0"/>
           </a:p>
           <a:p>
             <a:endParaRPr lang="en-US" dirty="0"/>
@@ -7279,7 +7293,7 @@
               <a:t>xml.htm</a:t>
             </a:r>
             <a:r>
-              <a:rPr lang="en-US" sz="1000" smtClean="0">
+              <a:rPr lang="en-US" sz="1000" dirty="0" smtClean="0">
                 <a:cs typeface="Courier"/>
               </a:rPr>
               <a:t>)</a:t>

</xml_diff>